<commit_message>
Added more slides to optical flow
</commit_message>
<xml_diff>
--- a/presentation/SloMo.pptx
+++ b/presentation/SloMo.pptx
@@ -6,9 +6,20 @@
   </p:sldMasterIdLst>
   <p:sldIdLst>
     <p:sldId id="256" r:id="rId2"/>
-    <p:sldId id="257" r:id="rId3"/>
-    <p:sldId id="258" r:id="rId4"/>
-    <p:sldId id="259" r:id="rId5"/>
+    <p:sldId id="258" r:id="rId3"/>
+    <p:sldId id="259" r:id="rId4"/>
+    <p:sldId id="260" r:id="rId5"/>
+    <p:sldId id="265" r:id="rId6"/>
+    <p:sldId id="268" r:id="rId7"/>
+    <p:sldId id="266" r:id="rId8"/>
+    <p:sldId id="267" r:id="rId9"/>
+    <p:sldId id="269" r:id="rId10"/>
+    <p:sldId id="270" r:id="rId11"/>
+    <p:sldId id="261" r:id="rId12"/>
+    <p:sldId id="264" r:id="rId13"/>
+    <p:sldId id="263" r:id="rId14"/>
+    <p:sldId id="262" r:id="rId15"/>
+    <p:sldId id="271" r:id="rId16"/>
   </p:sldIdLst>
   <p:sldSz cx="9144000" cy="6858000" type="screen4x3"/>
   <p:notesSz cx="6858000" cy="9144000"/>
@@ -3448,6 +3459,815 @@
 </p:sld>
 </file>
 
+<file path=ppt/slides/slide10.xml><?xml version="1.0" encoding="utf-8"?>
+<p:sld xmlns:a="http://schemas.openxmlformats.org/drawingml/2006/main" xmlns:r="http://schemas.openxmlformats.org/officeDocument/2006/relationships" xmlns:p="http://schemas.openxmlformats.org/presentationml/2006/main">
+  <p:cSld>
+    <p:spTree>
+      <p:nvGrpSpPr>
+        <p:cNvPr id="1" name=""/>
+        <p:cNvGrpSpPr/>
+        <p:nvPr/>
+      </p:nvGrpSpPr>
+      <p:grpSpPr>
+        <a:xfrm>
+          <a:off x="0" y="0"/>
+          <a:ext cx="0" cy="0"/>
+          <a:chOff x="0" y="0"/>
+          <a:chExt cx="0" cy="0"/>
+        </a:xfrm>
+      </p:grpSpPr>
+      <p:sp>
+        <p:nvSpPr>
+          <p:cNvPr id="2" name="Title 1"/>
+          <p:cNvSpPr>
+            <a:spLocks noGrp="1"/>
+          </p:cNvSpPr>
+          <p:nvPr>
+            <p:ph type="title"/>
+          </p:nvPr>
+        </p:nvSpPr>
+        <p:spPr/>
+        <p:txBody>
+          <a:bodyPr/>
+          <a:lstStyle/>
+          <a:p>
+            <a:r>
+              <a:rPr lang="en-US" dirty="0" smtClean="0"/>
+              <a:t>THEORY</a:t>
+            </a:r>
+            <a:endParaRPr lang="en-US" dirty="0"/>
+          </a:p>
+        </p:txBody>
+      </p:sp>
+      <p:sp>
+        <p:nvSpPr>
+          <p:cNvPr id="3" name="Content Placeholder 2"/>
+          <p:cNvSpPr>
+            <a:spLocks noGrp="1"/>
+          </p:cNvSpPr>
+          <p:nvPr>
+            <p:ph idx="1"/>
+          </p:nvPr>
+        </p:nvSpPr>
+        <p:spPr/>
+        <p:txBody>
+          <a:bodyPr/>
+          <a:lstStyle/>
+          <a:p>
+            <a:r>
+              <a:rPr lang="en-US" dirty="0" err="1" smtClean="0"/>
+              <a:t>Farneback</a:t>
+            </a:r>
+            <a:r>
+              <a:rPr lang="en-US" dirty="0" smtClean="0"/>
+              <a:t> :</a:t>
+            </a:r>
+          </a:p>
+          <a:p>
+            <a:endParaRPr lang="en-US" dirty="0" smtClean="0"/>
+          </a:p>
+          <a:p>
+            <a:r>
+              <a:rPr lang="en-US" dirty="0" smtClean="0"/>
+              <a:t>Approximate each </a:t>
+            </a:r>
+            <a:r>
+              <a:rPr lang="en-US" dirty="0" err="1" smtClean="0"/>
+              <a:t>neighbourhood</a:t>
+            </a:r>
+            <a:r>
+              <a:rPr lang="en-US" dirty="0" smtClean="0"/>
+              <a:t> by a quadratic:</a:t>
+            </a:r>
+          </a:p>
+          <a:p>
+            <a:endParaRPr lang="en-US" dirty="0" smtClean="0"/>
+          </a:p>
+          <a:p>
+            <a:endParaRPr lang="en-US" dirty="0" smtClean="0"/>
+          </a:p>
+          <a:p>
+            <a:r>
+              <a:rPr lang="en-US" dirty="0" smtClean="0"/>
+              <a:t>If  such a quadratic undergoes displacement d,</a:t>
+            </a:r>
+          </a:p>
+          <a:p>
+            <a:endParaRPr lang="en-US" dirty="0"/>
+          </a:p>
+          <a:p>
+            <a:endParaRPr lang="en-US" dirty="0" smtClean="0"/>
+          </a:p>
+          <a:p>
+            <a:r>
+              <a:rPr lang="en-US" dirty="0" smtClean="0"/>
+              <a:t>The resultant is also quadratic and we can solve for d</a:t>
+            </a:r>
+          </a:p>
+          <a:p>
+            <a:endParaRPr lang="en-US" dirty="0"/>
+          </a:p>
+          <a:p>
+            <a:endParaRPr lang="en-US" dirty="0"/>
+          </a:p>
+        </p:txBody>
+      </p:sp>
+      <p:pic>
+        <p:nvPicPr>
+          <p:cNvPr id="4" name="Picture 3"/>
+          <p:cNvPicPr>
+            <a:picLocks noChangeAspect="1"/>
+          </p:cNvPicPr>
+          <p:nvPr/>
+        </p:nvPicPr>
+        <p:blipFill>
+          <a:blip r:embed="rId2"/>
+          <a:stretch>
+            <a:fillRect/>
+          </a:stretch>
+        </p:blipFill>
+        <p:spPr>
+          <a:xfrm>
+            <a:off x="2048933" y="3149600"/>
+            <a:ext cx="5334847" cy="609600"/>
+          </a:xfrm>
+          <a:prstGeom prst="rect">
+            <a:avLst/>
+          </a:prstGeom>
+        </p:spPr>
+      </p:pic>
+      <p:pic>
+        <p:nvPicPr>
+          <p:cNvPr id="5" name="Picture 4"/>
+          <p:cNvPicPr>
+            <a:picLocks noChangeAspect="1"/>
+          </p:cNvPicPr>
+          <p:nvPr/>
+        </p:nvPicPr>
+        <p:blipFill>
+          <a:blip r:embed="rId3"/>
+          <a:stretch>
+            <a:fillRect/>
+          </a:stretch>
+        </p:blipFill>
+        <p:spPr>
+          <a:xfrm>
+            <a:off x="1530684" y="4318000"/>
+            <a:ext cx="2323432" cy="558800"/>
+          </a:xfrm>
+          <a:prstGeom prst="rect">
+            <a:avLst/>
+          </a:prstGeom>
+        </p:spPr>
+      </p:pic>
+    </p:spTree>
+    <p:extLst>
+      <p:ext uri="{BB962C8B-B14F-4D97-AF65-F5344CB8AC3E}">
+        <p14:creationId xmlns:p14="http://schemas.microsoft.com/office/powerpoint/2010/main" val="4119203968"/>
+      </p:ext>
+    </p:extLst>
+  </p:cSld>
+  <p:clrMapOvr>
+    <a:masterClrMapping/>
+  </p:clrMapOvr>
+</p:sld>
+</file>
+
+<file path=ppt/slides/slide11.xml><?xml version="1.0" encoding="utf-8"?>
+<p:sld xmlns:a="http://schemas.openxmlformats.org/drawingml/2006/main" xmlns:r="http://schemas.openxmlformats.org/officeDocument/2006/relationships" xmlns:p="http://schemas.openxmlformats.org/presentationml/2006/main">
+  <p:cSld>
+    <p:spTree>
+      <p:nvGrpSpPr>
+        <p:cNvPr id="1" name=""/>
+        <p:cNvGrpSpPr/>
+        <p:nvPr/>
+      </p:nvGrpSpPr>
+      <p:grpSpPr>
+        <a:xfrm>
+          <a:off x="0" y="0"/>
+          <a:ext cx="0" cy="0"/>
+          <a:chOff x="0" y="0"/>
+          <a:chExt cx="0" cy="0"/>
+        </a:xfrm>
+      </p:grpSpPr>
+      <p:sp>
+        <p:nvSpPr>
+          <p:cNvPr id="2" name="Title 1"/>
+          <p:cNvSpPr>
+            <a:spLocks noGrp="1"/>
+          </p:cNvSpPr>
+          <p:nvPr>
+            <p:ph type="title"/>
+          </p:nvPr>
+        </p:nvSpPr>
+        <p:spPr/>
+        <p:txBody>
+          <a:bodyPr/>
+          <a:lstStyle/>
+          <a:p>
+            <a:r>
+              <a:rPr lang="en-US" dirty="0" smtClean="0"/>
+              <a:t>THEORY</a:t>
+            </a:r>
+            <a:endParaRPr lang="en-US" dirty="0"/>
+          </a:p>
+        </p:txBody>
+      </p:sp>
+      <p:sp>
+        <p:nvSpPr>
+          <p:cNvPr id="3" name="Content Placeholder 2"/>
+          <p:cNvSpPr>
+            <a:spLocks noGrp="1"/>
+          </p:cNvSpPr>
+          <p:nvPr>
+            <p:ph idx="1"/>
+          </p:nvPr>
+        </p:nvSpPr>
+        <p:spPr/>
+        <p:txBody>
+          <a:bodyPr/>
+          <a:lstStyle/>
+          <a:p>
+            <a:endParaRPr lang="en-US" dirty="0" smtClean="0"/>
+          </a:p>
+          <a:p>
+            <a:r>
+              <a:rPr lang="en-US" dirty="0" err="1" smtClean="0"/>
+              <a:t>Variational</a:t>
+            </a:r>
+            <a:r>
+              <a:rPr lang="en-US" dirty="0" smtClean="0"/>
+              <a:t> Framework </a:t>
+            </a:r>
+          </a:p>
+          <a:p>
+            <a:endParaRPr lang="en-US" dirty="0"/>
+          </a:p>
+          <a:p>
+            <a:endParaRPr lang="en-US" dirty="0"/>
+          </a:p>
+        </p:txBody>
+      </p:sp>
+      <p:pic>
+        <p:nvPicPr>
+          <p:cNvPr id="6" name="Picture 16" descr="addin_tmp"/>
+          <p:cNvPicPr>
+            <a:picLocks noChangeAspect="1" noChangeArrowheads="1"/>
+          </p:cNvPicPr>
+          <p:nvPr>
+            <p:custDataLst>
+              <p:tags r:id="rId1"/>
+            </p:custDataLst>
+          </p:nvPr>
+        </p:nvPicPr>
+        <p:blipFill>
+          <a:blip r:embed="rId3">
+            <a:extLst>
+              <a:ext uri="{28A0092B-C50C-407E-A947-70E740481C1C}">
+                <a14:useLocalDpi xmlns:a14="http://schemas.microsoft.com/office/drawing/2010/main" val="0"/>
+              </a:ext>
+            </a:extLst>
+          </a:blip>
+          <a:srcRect/>
+          <a:stretch>
+            <a:fillRect/>
+          </a:stretch>
+        </p:blipFill>
+        <p:spPr bwMode="auto">
+          <a:xfrm>
+            <a:off x="951909" y="3081867"/>
+            <a:ext cx="7691634" cy="880533"/>
+          </a:xfrm>
+          <a:prstGeom prst="rect">
+            <a:avLst/>
+          </a:prstGeom>
+          <a:noFill/>
+          <a:ln>
+            <a:noFill/>
+          </a:ln>
+          <a:effectLst/>
+          <a:extLst>
+            <a:ext uri="{909E8E84-426E-40dd-AFC4-6F175D3DCCD1}">
+              <a14:hiddenFill xmlns:a14="http://schemas.microsoft.com/office/drawing/2010/main">
+                <a:solidFill>
+                  <a:schemeClr val="accent1"/>
+                </a:solidFill>
+              </a14:hiddenFill>
+            </a:ext>
+            <a:ext uri="{91240B29-F687-4f45-9708-019B960494DF}">
+              <a14:hiddenLine xmlns:a14="http://schemas.microsoft.com/office/drawing/2010/main" w="9525">
+                <a:solidFill>
+                  <a:schemeClr val="tx1"/>
+                </a:solidFill>
+                <a:miter lim="800000"/>
+                <a:headEnd/>
+                <a:tailEnd/>
+              </a14:hiddenLine>
+            </a:ext>
+            <a:ext uri="{AF507438-7753-43e0-B8FC-AC1667EBCBE1}">
+              <a14:hiddenEffects xmlns:a14="http://schemas.microsoft.com/office/drawing/2010/main">
+                <a:effectLst>
+                  <a:outerShdw blurRad="63500" dist="38099" dir="2700000" algn="ctr" rotWithShape="0">
+                    <a:schemeClr val="bg2">
+                      <a:alpha val="74998"/>
+                    </a:schemeClr>
+                  </a:outerShdw>
+                </a:effectLst>
+              </a14:hiddenEffects>
+            </a:ext>
+          </a:extLst>
+        </p:spPr>
+      </p:pic>
+      <p:pic>
+        <p:nvPicPr>
+          <p:cNvPr id="80" name="Picture 79"/>
+          <p:cNvPicPr>
+            <a:picLocks noChangeAspect="1"/>
+          </p:cNvPicPr>
+          <p:nvPr/>
+        </p:nvPicPr>
+        <p:blipFill>
+          <a:blip r:embed="rId4"/>
+          <a:stretch>
+            <a:fillRect/>
+          </a:stretch>
+        </p:blipFill>
+        <p:spPr>
+          <a:xfrm>
+            <a:off x="38100" y="4415367"/>
+            <a:ext cx="9067800" cy="635000"/>
+          </a:xfrm>
+          <a:prstGeom prst="rect">
+            <a:avLst/>
+          </a:prstGeom>
+        </p:spPr>
+      </p:pic>
+    </p:spTree>
+    <p:extLst>
+      <p:ext uri="{BB962C8B-B14F-4D97-AF65-F5344CB8AC3E}">
+        <p14:creationId xmlns:p14="http://schemas.microsoft.com/office/powerpoint/2010/main" val="4248149398"/>
+      </p:ext>
+    </p:extLst>
+  </p:cSld>
+  <p:clrMapOvr>
+    <a:masterClrMapping/>
+  </p:clrMapOvr>
+  <p:timing>
+    <p:tnLst>
+      <p:par>
+        <p:cTn xmlns:p14="http://schemas.microsoft.com/office/powerpoint/2010/main" id="1" dur="indefinite" restart="never" nodeType="tmRoot">
+          <p:childTnLst>
+            <p:seq concurrent="1" nextAc="seek">
+              <p:cTn id="2" dur="indefinite" nodeType="mainSeq">
+                <p:childTnLst>
+                  <p:par>
+                    <p:cTn id="3" fill="hold">
+                      <p:stCondLst>
+                        <p:cond delay="indefinite"/>
+                        <p:cond evt="onBegin" delay="0">
+                          <p:tn val="2"/>
+                        </p:cond>
+                      </p:stCondLst>
+                      <p:childTnLst>
+                        <p:par>
+                          <p:cTn id="4" fill="hold">
+                            <p:stCondLst>
+                              <p:cond delay="0"/>
+                            </p:stCondLst>
+                            <p:childTnLst>
+                              <p:par>
+                                <p:cTn id="5" presetID="1" presetClass="entr" presetSubtype="0" fill="hold" nodeType="withEffect">
+                                  <p:stCondLst>
+                                    <p:cond delay="0"/>
+                                  </p:stCondLst>
+                                  <p:childTnLst>
+                                    <p:set>
+                                      <p:cBhvr>
+                                        <p:cTn id="6" dur="1" fill="hold">
+                                          <p:stCondLst>
+                                            <p:cond delay="0"/>
+                                          </p:stCondLst>
+                                        </p:cTn>
+                                        <p:tgtEl>
+                                          <p:spTgt spid="6"/>
+                                        </p:tgtEl>
+                                        <p:attrNameLst>
+                                          <p:attrName>style.visibility</p:attrName>
+                                        </p:attrNameLst>
+                                      </p:cBhvr>
+                                      <p:to>
+                                        <p:strVal val="visible"/>
+                                      </p:to>
+                                    </p:set>
+                                  </p:childTnLst>
+                                </p:cTn>
+                              </p:par>
+                            </p:childTnLst>
+                          </p:cTn>
+                        </p:par>
+                      </p:childTnLst>
+                    </p:cTn>
+                  </p:par>
+                </p:childTnLst>
+              </p:cTn>
+              <p:prevCondLst>
+                <p:cond evt="onPrev" delay="0">
+                  <p:tgtEl>
+                    <p:sldTgt/>
+                  </p:tgtEl>
+                </p:cond>
+              </p:prevCondLst>
+              <p:nextCondLst>
+                <p:cond evt="onNext" delay="0">
+                  <p:tgtEl>
+                    <p:sldTgt/>
+                  </p:tgtEl>
+                </p:cond>
+              </p:nextCondLst>
+            </p:seq>
+          </p:childTnLst>
+        </p:cTn>
+      </p:par>
+    </p:tnLst>
+  </p:timing>
+</p:sld>
+</file>
+
+<file path=ppt/slides/slide12.xml><?xml version="1.0" encoding="utf-8"?>
+<p:sld xmlns:a="http://schemas.openxmlformats.org/drawingml/2006/main" xmlns:r="http://schemas.openxmlformats.org/officeDocument/2006/relationships" xmlns:p="http://schemas.openxmlformats.org/presentationml/2006/main">
+  <p:cSld>
+    <p:spTree>
+      <p:nvGrpSpPr>
+        <p:cNvPr id="1" name=""/>
+        <p:cNvGrpSpPr/>
+        <p:nvPr/>
+      </p:nvGrpSpPr>
+      <p:grpSpPr>
+        <a:xfrm>
+          <a:off x="0" y="0"/>
+          <a:ext cx="0" cy="0"/>
+          <a:chOff x="0" y="0"/>
+          <a:chExt cx="0" cy="0"/>
+        </a:xfrm>
+      </p:grpSpPr>
+      <p:sp>
+        <p:nvSpPr>
+          <p:cNvPr id="2" name="Title 1"/>
+          <p:cNvSpPr>
+            <a:spLocks noGrp="1"/>
+          </p:cNvSpPr>
+          <p:nvPr>
+            <p:ph type="title"/>
+          </p:nvPr>
+        </p:nvSpPr>
+        <p:spPr/>
+        <p:txBody>
+          <a:bodyPr/>
+          <a:lstStyle/>
+          <a:p>
+            <a:r>
+              <a:rPr lang="en-US" dirty="0" smtClean="0"/>
+              <a:t>BETTER OPTICAL FLOW</a:t>
+            </a:r>
+            <a:endParaRPr lang="en-US" dirty="0"/>
+          </a:p>
+        </p:txBody>
+      </p:sp>
+      <p:sp>
+        <p:nvSpPr>
+          <p:cNvPr id="3" name="Content Placeholder 2"/>
+          <p:cNvSpPr>
+            <a:spLocks noGrp="1"/>
+          </p:cNvSpPr>
+          <p:nvPr>
+            <p:ph idx="1"/>
+          </p:nvPr>
+        </p:nvSpPr>
+        <p:spPr/>
+        <p:txBody>
+          <a:bodyPr/>
+          <a:lstStyle/>
+          <a:p>
+            <a:r>
+              <a:rPr lang="en-US" dirty="0" smtClean="0"/>
+              <a:t>Large displacements (multiple scales )</a:t>
+            </a:r>
+          </a:p>
+          <a:p>
+            <a:r>
+              <a:rPr lang="en-US" dirty="0" smtClean="0"/>
+              <a:t>Descriptor based matching (matching should guide flow)</a:t>
+            </a:r>
+          </a:p>
+          <a:p>
+            <a:r>
+              <a:rPr lang="en-US" dirty="0" smtClean="0"/>
+              <a:t>Non rigid matching </a:t>
+            </a:r>
+          </a:p>
+          <a:p>
+            <a:r>
+              <a:rPr lang="en-US" dirty="0" smtClean="0"/>
+              <a:t>Preserving edges </a:t>
+            </a:r>
+          </a:p>
+          <a:p>
+            <a:pPr lvl="1"/>
+            <a:r>
+              <a:rPr lang="en-US" dirty="0" smtClean="0"/>
+              <a:t>Edges are superset of motion boundaries</a:t>
+            </a:r>
+          </a:p>
+          <a:p>
+            <a:pPr lvl="1"/>
+            <a:r>
+              <a:rPr lang="en-US" dirty="0" smtClean="0"/>
+              <a:t>Addressed by EPIC flow ( currently state of the art ) </a:t>
+            </a:r>
+          </a:p>
+          <a:p>
+            <a:endParaRPr lang="en-US" dirty="0"/>
+          </a:p>
+        </p:txBody>
+      </p:sp>
+    </p:spTree>
+    <p:extLst>
+      <p:ext uri="{BB962C8B-B14F-4D97-AF65-F5344CB8AC3E}">
+        <p14:creationId xmlns:p14="http://schemas.microsoft.com/office/powerpoint/2010/main" val="419280118"/>
+      </p:ext>
+    </p:extLst>
+  </p:cSld>
+  <p:clrMapOvr>
+    <a:masterClrMapping/>
+  </p:clrMapOvr>
+  <p:timing>
+    <p:tnLst>
+      <p:par>
+        <p:cTn xmlns:p14="http://schemas.microsoft.com/office/powerpoint/2010/main" id="1" dur="indefinite" restart="never" nodeType="tmRoot"/>
+      </p:par>
+    </p:tnLst>
+  </p:timing>
+</p:sld>
+</file>
+
+<file path=ppt/slides/slide13.xml><?xml version="1.0" encoding="utf-8"?>
+<p:sld xmlns:a="http://schemas.openxmlformats.org/drawingml/2006/main" xmlns:r="http://schemas.openxmlformats.org/officeDocument/2006/relationships" xmlns:p="http://schemas.openxmlformats.org/presentationml/2006/main">
+  <p:cSld>
+    <p:spTree>
+      <p:nvGrpSpPr>
+        <p:cNvPr id="1" name=""/>
+        <p:cNvGrpSpPr/>
+        <p:nvPr/>
+      </p:nvGrpSpPr>
+      <p:grpSpPr>
+        <a:xfrm>
+          <a:off x="0" y="0"/>
+          <a:ext cx="0" cy="0"/>
+          <a:chOff x="0" y="0"/>
+          <a:chExt cx="0" cy="0"/>
+        </a:xfrm>
+      </p:grpSpPr>
+      <p:sp>
+        <p:nvSpPr>
+          <p:cNvPr id="2" name="Title 1"/>
+          <p:cNvSpPr>
+            <a:spLocks noGrp="1"/>
+          </p:cNvSpPr>
+          <p:nvPr>
+            <p:ph type="title"/>
+          </p:nvPr>
+        </p:nvSpPr>
+        <p:spPr/>
+        <p:txBody>
+          <a:bodyPr>
+            <a:normAutofit fontScale="90000"/>
+          </a:bodyPr>
+          <a:lstStyle/>
+          <a:p>
+            <a:r>
+              <a:rPr lang="en-US" dirty="0" smtClean="0"/>
+              <a:t>Deep Flow </a:t>
+            </a:r>
+            <a:r>
+              <a:rPr lang="en-US" dirty="0"/>
+              <a:t>[</a:t>
+            </a:r>
+            <a:r>
+              <a:rPr lang="en-US" dirty="0" err="1"/>
+              <a:t>Weinzaepfel</a:t>
+            </a:r>
+            <a:r>
+              <a:rPr lang="en-US" dirty="0"/>
+              <a:t> et al ] </a:t>
+            </a:r>
+            <a:r>
+              <a:rPr lang="en-US" dirty="0" smtClean="0"/>
+              <a:t>Non-rigid matching</a:t>
+            </a:r>
+            <a:endParaRPr lang="en-US" dirty="0"/>
+          </a:p>
+        </p:txBody>
+      </p:sp>
+      <p:pic>
+        <p:nvPicPr>
+          <p:cNvPr id="5" name="Content Placeholder 4"/>
+          <p:cNvPicPr>
+            <a:picLocks noGrp="1" noChangeAspect="1"/>
+          </p:cNvPicPr>
+          <p:nvPr>
+            <p:ph idx="1"/>
+          </p:nvPr>
+        </p:nvPicPr>
+        <p:blipFill>
+          <a:blip r:embed="rId2"/>
+          <a:srcRect l="2310" r="2310"/>
+          <a:stretch>
+            <a:fillRect/>
+          </a:stretch>
+        </p:blipFill>
+        <p:spPr/>
+      </p:pic>
+    </p:spTree>
+    <p:extLst>
+      <p:ext uri="{BB962C8B-B14F-4D97-AF65-F5344CB8AC3E}">
+        <p14:creationId xmlns:p14="http://schemas.microsoft.com/office/powerpoint/2010/main" val="3101397370"/>
+      </p:ext>
+    </p:extLst>
+  </p:cSld>
+  <p:clrMapOvr>
+    <a:masterClrMapping/>
+  </p:clrMapOvr>
+  <p:timing>
+    <p:tnLst>
+      <p:par>
+        <p:cTn xmlns:p14="http://schemas.microsoft.com/office/powerpoint/2010/main" id="1" dur="indefinite" restart="never" nodeType="tmRoot"/>
+      </p:par>
+    </p:tnLst>
+  </p:timing>
+</p:sld>
+</file>
+
+<file path=ppt/slides/slide14.xml><?xml version="1.0" encoding="utf-8"?>
+<p:sld xmlns:a="http://schemas.openxmlformats.org/drawingml/2006/main" xmlns:r="http://schemas.openxmlformats.org/officeDocument/2006/relationships" xmlns:p="http://schemas.openxmlformats.org/presentationml/2006/main">
+  <p:cSld>
+    <p:spTree>
+      <p:nvGrpSpPr>
+        <p:cNvPr id="1" name=""/>
+        <p:cNvGrpSpPr/>
+        <p:nvPr/>
+      </p:nvGrpSpPr>
+      <p:grpSpPr>
+        <a:xfrm>
+          <a:off x="0" y="0"/>
+          <a:ext cx="0" cy="0"/>
+          <a:chOff x="0" y="0"/>
+          <a:chExt cx="0" cy="0"/>
+        </a:xfrm>
+      </p:grpSpPr>
+      <p:sp>
+        <p:nvSpPr>
+          <p:cNvPr id="2" name="Title 1"/>
+          <p:cNvSpPr>
+            <a:spLocks noGrp="1"/>
+          </p:cNvSpPr>
+          <p:nvPr>
+            <p:ph type="title"/>
+          </p:nvPr>
+        </p:nvSpPr>
+        <p:spPr/>
+        <p:txBody>
+          <a:bodyPr>
+            <a:normAutofit fontScale="90000"/>
+          </a:bodyPr>
+          <a:lstStyle/>
+          <a:p>
+            <a:r>
+              <a:rPr lang="en-US" dirty="0" smtClean="0"/>
+              <a:t>Deep Flow [</a:t>
+            </a:r>
+            <a:r>
+              <a:rPr lang="en-US" dirty="0" err="1" smtClean="0"/>
+              <a:t>Weinzaepfel</a:t>
+            </a:r>
+            <a:r>
+              <a:rPr lang="en-US" dirty="0" smtClean="0"/>
+              <a:t> et al ] Pipeline </a:t>
+            </a:r>
+            <a:endParaRPr lang="en-US" dirty="0"/>
+          </a:p>
+        </p:txBody>
+      </p:sp>
+      <p:pic>
+        <p:nvPicPr>
+          <p:cNvPr id="146" name="Content Placeholder 145"/>
+          <p:cNvPicPr>
+            <a:picLocks noGrp="1" noChangeAspect="1"/>
+          </p:cNvPicPr>
+          <p:nvPr>
+            <p:ph idx="1"/>
+          </p:nvPr>
+        </p:nvPicPr>
+        <p:blipFill>
+          <a:blip r:embed="rId2"/>
+          <a:srcRect t="-32341" b="-32341"/>
+          <a:stretch>
+            <a:fillRect/>
+          </a:stretch>
+        </p:blipFill>
+        <p:spPr/>
+      </p:pic>
+    </p:spTree>
+    <p:extLst>
+      <p:ext uri="{BB962C8B-B14F-4D97-AF65-F5344CB8AC3E}">
+        <p14:creationId xmlns:p14="http://schemas.microsoft.com/office/powerpoint/2010/main" val="749562448"/>
+      </p:ext>
+    </p:extLst>
+  </p:cSld>
+  <p:clrMapOvr>
+    <a:masterClrMapping/>
+  </p:clrMapOvr>
+  <p:timing>
+    <p:tnLst>
+      <p:par>
+        <p:cTn xmlns:p14="http://schemas.microsoft.com/office/powerpoint/2010/main" id="1" dur="indefinite" restart="never" nodeType="tmRoot"/>
+      </p:par>
+    </p:tnLst>
+  </p:timing>
+</p:sld>
+</file>
+
+<file path=ppt/slides/slide15.xml><?xml version="1.0" encoding="utf-8"?>
+<p:sld xmlns:a="http://schemas.openxmlformats.org/drawingml/2006/main" xmlns:r="http://schemas.openxmlformats.org/officeDocument/2006/relationships" xmlns:p="http://schemas.openxmlformats.org/presentationml/2006/main">
+  <p:cSld>
+    <p:spTree>
+      <p:nvGrpSpPr>
+        <p:cNvPr id="1" name=""/>
+        <p:cNvGrpSpPr/>
+        <p:nvPr/>
+      </p:nvGrpSpPr>
+      <p:grpSpPr>
+        <a:xfrm>
+          <a:off x="0" y="0"/>
+          <a:ext cx="0" cy="0"/>
+          <a:chOff x="0" y="0"/>
+          <a:chExt cx="0" cy="0"/>
+        </a:xfrm>
+      </p:grpSpPr>
+      <p:sp>
+        <p:nvSpPr>
+          <p:cNvPr id="2" name="Title 1"/>
+          <p:cNvSpPr>
+            <a:spLocks noGrp="1"/>
+          </p:cNvSpPr>
+          <p:nvPr>
+            <p:ph type="title"/>
+          </p:nvPr>
+        </p:nvSpPr>
+        <p:spPr/>
+        <p:txBody>
+          <a:bodyPr/>
+          <a:lstStyle/>
+          <a:p>
+            <a:r>
+              <a:rPr lang="en-US" dirty="0" smtClean="0"/>
+              <a:t>THANK YOU</a:t>
+            </a:r>
+            <a:endParaRPr lang="en-US" dirty="0"/>
+          </a:p>
+        </p:txBody>
+      </p:sp>
+      <p:sp>
+        <p:nvSpPr>
+          <p:cNvPr id="3" name="Content Placeholder 2"/>
+          <p:cNvSpPr>
+            <a:spLocks noGrp="1"/>
+          </p:cNvSpPr>
+          <p:nvPr>
+            <p:ph idx="1"/>
+          </p:nvPr>
+        </p:nvSpPr>
+        <p:spPr/>
+        <p:txBody>
+          <a:bodyPr/>
+          <a:lstStyle/>
+          <a:p>
+            <a:endParaRPr lang="en-US"/>
+          </a:p>
+        </p:txBody>
+      </p:sp>
+    </p:spTree>
+    <p:extLst>
+      <p:ext uri="{BB962C8B-B14F-4D97-AF65-F5344CB8AC3E}">
+        <p14:creationId xmlns:p14="http://schemas.microsoft.com/office/powerpoint/2010/main" val="770759138"/>
+      </p:ext>
+    </p:extLst>
+  </p:cSld>
+  <p:clrMapOvr>
+    <a:masterClrMapping/>
+  </p:clrMapOvr>
+</p:sld>
+</file>
+
 <file path=ppt/slides/slide2.xml><?xml version="1.0" encoding="utf-8"?>
 <p:sld xmlns:a="http://schemas.openxmlformats.org/drawingml/2006/main" xmlns:r="http://schemas.openxmlformats.org/officeDocument/2006/relationships" xmlns:p="http://schemas.openxmlformats.org/presentationml/2006/main">
   <p:cSld>
@@ -3482,7 +4302,7 @@
           <a:p>
             <a:r>
               <a:rPr lang="en-US" dirty="0" smtClean="0"/>
-              <a:t>OPTICAL FLOW</a:t>
+              <a:t>METHOD 1 (Warping triangulations)</a:t>
             </a:r>
             <a:endParaRPr lang="en-US" dirty="0"/>
           </a:p>
@@ -3500,23 +4320,155 @@
         </p:nvSpPr>
         <p:spPr/>
         <p:txBody>
-          <a:bodyPr/>
-          <a:lstStyle/>
-          <a:p>
+          <a:bodyPr>
+            <a:normAutofit fontScale="92500" lnSpcReduction="20000"/>
+          </a:bodyPr>
+          <a:lstStyle/>
+          <a:p>
+            <a:pPr marL="0" indent="0">
+              <a:buNone/>
+            </a:pPr>
+            <a:r>
+              <a:rPr lang="en-US" dirty="0" smtClean="0"/>
+              <a:t>For every successive pair of frames A and B:</a:t>
+            </a:r>
+          </a:p>
+          <a:p>
+            <a:pPr marL="457200" indent="-457200">
+              <a:buFont typeface="+mj-lt"/>
+              <a:buAutoNum type="arabicPeriod"/>
+            </a:pPr>
+            <a:r>
+              <a:rPr lang="en-US" dirty="0" smtClean="0"/>
+              <a:t>Choose points for triangulation</a:t>
+            </a:r>
+          </a:p>
+          <a:p>
+            <a:pPr lvl="1"/>
+            <a:r>
+              <a:rPr lang="en-US" dirty="0" smtClean="0"/>
+              <a:t>Uniformly spaced </a:t>
+            </a:r>
+          </a:p>
+          <a:p>
+            <a:pPr lvl="1"/>
+            <a:r>
+              <a:rPr lang="en-US" dirty="0" smtClean="0"/>
+              <a:t>Edges (Canny) edges</a:t>
+            </a:r>
+          </a:p>
+          <a:p>
+            <a:pPr lvl="1"/>
+            <a:r>
+              <a:rPr lang="en-US" dirty="0" smtClean="0"/>
+              <a:t>Good features to track (corners)</a:t>
+            </a:r>
+          </a:p>
+          <a:p>
+            <a:pPr lvl="1"/>
             <a:endParaRPr lang="en-US" dirty="0"/>
+          </a:p>
+          <a:p>
+            <a:pPr marL="457200" indent="-457200">
+              <a:buFont typeface="+mj-lt"/>
+              <a:buAutoNum type="arabicPeriod"/>
+            </a:pPr>
+            <a:r>
+              <a:rPr lang="en-US" dirty="0" err="1" smtClean="0"/>
+              <a:t>Deluanay</a:t>
+            </a:r>
+            <a:r>
+              <a:rPr lang="en-US" dirty="0" smtClean="0"/>
+              <a:t> triangulation</a:t>
+            </a:r>
+          </a:p>
+          <a:p>
+            <a:pPr marL="457200" indent="-457200">
+              <a:buFont typeface="+mj-lt"/>
+              <a:buAutoNum type="arabicPeriod"/>
+            </a:pPr>
+            <a:endParaRPr lang="en-US" dirty="0"/>
+          </a:p>
+          <a:p>
+            <a:pPr marL="457200" indent="-457200">
+              <a:buFont typeface="+mj-lt"/>
+              <a:buAutoNum type="arabicPeriod"/>
+            </a:pPr>
+            <a:r>
+              <a:rPr lang="en-US" dirty="0" smtClean="0"/>
+              <a:t>For corners of every triangle in B</a:t>
+            </a:r>
+          </a:p>
+          <a:p>
+            <a:pPr lvl="1"/>
+            <a:r>
+              <a:rPr lang="en-US" dirty="0" smtClean="0"/>
+              <a:t>find the corresponding points in A by adding optical flow</a:t>
+            </a:r>
+          </a:p>
+          <a:p>
+            <a:pPr lvl="1"/>
+            <a:r>
+              <a:rPr lang="en-US" dirty="0" smtClean="0"/>
+              <a:t>Corresponding points in the interpolated frame are obtained by adding  flow scaled by 1/n, 2/n, … , (n-1)/n respectively where n is video slowdown factor </a:t>
+            </a:r>
+          </a:p>
+          <a:p>
+            <a:pPr lvl="1"/>
+            <a:r>
+              <a:rPr lang="en-US" dirty="0"/>
+              <a:t>f</a:t>
+            </a:r>
+            <a:r>
+              <a:rPr lang="en-US" dirty="0" smtClean="0"/>
+              <a:t>ind the affine transformation that maps triangle in A to B</a:t>
+            </a:r>
+          </a:p>
+          <a:p>
+            <a:pPr lvl="1"/>
+            <a:r>
+              <a:rPr lang="en-US" dirty="0"/>
+              <a:t>i</a:t>
+            </a:r>
+            <a:r>
+              <a:rPr lang="en-US" dirty="0" smtClean="0"/>
+              <a:t>nvert the transformation and add to </a:t>
+            </a:r>
+            <a:r>
+              <a:rPr lang="en-US" dirty="0" err="1" smtClean="0"/>
+              <a:t>hashmap</a:t>
+            </a:r>
+            <a:r>
+              <a:rPr lang="en-US" dirty="0" smtClean="0"/>
+              <a:t> for that frame </a:t>
+            </a:r>
+          </a:p>
+          <a:p>
+            <a:pPr marL="457200" indent="-457200">
+              <a:buFont typeface="+mj-lt"/>
+              <a:buAutoNum type="arabicPeriod"/>
+            </a:pPr>
+            <a:endParaRPr lang="en-US" dirty="0" smtClean="0"/>
           </a:p>
         </p:txBody>
       </p:sp>
     </p:spTree>
     <p:extLst>
       <p:ext uri="{BB962C8B-B14F-4D97-AF65-F5344CB8AC3E}">
-        <p14:creationId xmlns:p14="http://schemas.microsoft.com/office/powerpoint/2010/main" val="772941525"/>
+        <p14:creationId xmlns:p14="http://schemas.microsoft.com/office/powerpoint/2010/main" val="1379762577"/>
       </p:ext>
     </p:extLst>
   </p:cSld>
   <p:clrMapOvr>
     <a:masterClrMapping/>
   </p:clrMapOvr>
+  <p:timing>
+    <p:tnLst>
+      <p:par>
+        <p:cTn xmlns:p14="http://schemas.microsoft.com/office/powerpoint/2010/main" id="1" dur="indefinite" restart="never" nodeType="tmRoot"/>
+      </p:par>
+    </p:tnLst>
+  </p:timing>
 </p:sld>
 </file>
 
@@ -3554,7 +4506,7 @@
           <a:p>
             <a:r>
               <a:rPr lang="en-US" dirty="0" smtClean="0"/>
-              <a:t>METHOD 1 </a:t>
+              <a:t>METHOD 1</a:t>
             </a:r>
             <a:endParaRPr lang="en-US" dirty="0"/>
           </a:p>
@@ -3572,160 +4524,93 @@
         </p:nvSpPr>
         <p:spPr/>
         <p:txBody>
-          <a:bodyPr>
-            <a:normAutofit fontScale="92500" lnSpcReduction="20000"/>
-          </a:bodyPr>
-          <a:lstStyle/>
-          <a:p>
-            <a:pPr marL="0" indent="0">
-              <a:buNone/>
-            </a:pPr>
-            <a:r>
-              <a:rPr lang="en-US" dirty="0" smtClean="0"/>
-              <a:t>For every successive pair of frames A and B:</a:t>
-            </a:r>
-          </a:p>
+          <a:bodyPr/>
+          <a:lstStyle/>
           <a:p>
             <a:pPr marL="457200" indent="-457200">
               <a:buFont typeface="+mj-lt"/>
-              <a:buAutoNum type="arabicPeriod"/>
+              <a:buAutoNum type="arabicPeriod" startAt="4"/>
             </a:pPr>
             <a:r>
               <a:rPr lang="en-US" dirty="0" smtClean="0"/>
-              <a:t>Choose points for triangulation</a:t>
+              <a:t>For every point in B</a:t>
             </a:r>
           </a:p>
           <a:p>
             <a:pPr lvl="1"/>
             <a:r>
               <a:rPr lang="en-US" dirty="0" smtClean="0"/>
-              <a:t>Uniformly spaced </a:t>
+              <a:t>Find the triangle it is contained in</a:t>
             </a:r>
           </a:p>
           <a:p>
             <a:pPr lvl="1"/>
             <a:r>
               <a:rPr lang="en-US" dirty="0" smtClean="0"/>
-              <a:t>Edges (Canny) edges</a:t>
+              <a:t>Find the corresponding inverse mapping </a:t>
             </a:r>
           </a:p>
           <a:p>
             <a:pPr lvl="1"/>
             <a:r>
               <a:rPr lang="en-US" dirty="0" smtClean="0"/>
-              <a:t>Good features to track (corners)</a:t>
-            </a:r>
-          </a:p>
-          <a:p>
-            <a:pPr lvl="1"/>
-            <a:endParaRPr lang="en-US" dirty="0"/>
+              <a:t>Apply the inverse warp to get the point in A and the intermediate frames </a:t>
+            </a:r>
+          </a:p>
+          <a:p>
+            <a:pPr marL="274320" lvl="1" indent="0">
+              <a:buNone/>
+            </a:pPr>
+            <a:endParaRPr lang="en-US" dirty="0" smtClean="0"/>
           </a:p>
           <a:p>
             <a:pPr marL="457200" indent="-457200">
               <a:buFont typeface="+mj-lt"/>
-              <a:buAutoNum type="arabicPeriod"/>
+              <a:buAutoNum type="arabicPeriod" startAt="5"/>
             </a:pPr>
             <a:r>
+              <a:rPr lang="en-US" dirty="0" smtClean="0"/>
+              <a:t>Linear interpolation using ‘remap’   (</a:t>
+            </a:r>
+            <a:r>
               <a:rPr lang="en-US" dirty="0" err="1" smtClean="0"/>
-              <a:t>Deluanay</a:t>
-            </a:r>
-            <a:r>
-              <a:rPr lang="en-US" dirty="0" smtClean="0"/>
-              <a:t> triangulation</a:t>
+              <a:t>equaivalent</a:t>
+            </a:r>
+            <a:r>
+              <a:rPr lang="en-US" dirty="0" smtClean="0"/>
+              <a:t> of interp2) </a:t>
             </a:r>
           </a:p>
           <a:p>
             <a:pPr marL="457200" indent="-457200">
               <a:buFont typeface="+mj-lt"/>
-              <a:buAutoNum type="arabicPeriod"/>
+              <a:buAutoNum type="arabicPeriod" startAt="5"/>
+            </a:pPr>
+            <a:r>
+              <a:rPr lang="en-US" dirty="0" smtClean="0"/>
+              <a:t>“Cross-dissolve” between A and B </a:t>
+            </a:r>
+          </a:p>
+          <a:p>
+            <a:pPr marL="0" indent="0">
+              <a:buNone/>
+            </a:pPr>
+            <a:endParaRPr lang="en-US" dirty="0" smtClean="0"/>
+          </a:p>
+          <a:p>
+            <a:pPr marL="0" indent="0">
+              <a:buNone/>
             </a:pPr>
             <a:endParaRPr lang="en-US" dirty="0"/>
           </a:p>
           <a:p>
+            <a:endParaRPr lang="en-US" dirty="0"/>
+          </a:p>
+          <a:p>
             <a:pPr marL="457200" indent="-457200">
               <a:buFont typeface="+mj-lt"/>
-              <a:buAutoNum type="arabicPeriod"/>
+              <a:buAutoNum type="arabicPeriod" startAt="5"/>
             </a:pPr>
-            <a:r>
-              <a:rPr lang="en-US" dirty="0" smtClean="0"/>
-              <a:t>For corners of every triangle in B</a:t>
-            </a:r>
-          </a:p>
-          <a:p>
-            <a:pPr lvl="1"/>
-            <a:r>
-              <a:rPr lang="en-US" dirty="0" smtClean="0"/>
-              <a:t>find the corresponding points in A by adding optical flow</a:t>
-            </a:r>
-          </a:p>
-          <a:p>
-            <a:pPr lvl="1"/>
-            <a:r>
-              <a:rPr lang="en-US" dirty="0" smtClean="0"/>
-              <a:t>Corresponding points in the interpolated frame are obtained by adding  flow scaled by 1/n, 2/n, … , (n-1)/n respectively where n is video slowdown factor </a:t>
-            </a:r>
-          </a:p>
-          <a:p>
-            <a:pPr lvl="1"/>
-            <a:r>
-              <a:rPr lang="en-US" dirty="0"/>
-              <a:t>f</a:t>
-            </a:r>
-            <a:r>
-              <a:rPr lang="en-US" dirty="0" smtClean="0"/>
-              <a:t>ind the affine transformation that maps triangle in A to B</a:t>
-            </a:r>
-          </a:p>
-          <a:p>
-            <a:pPr lvl="1"/>
-            <a:r>
-              <a:rPr lang="en-US" dirty="0"/>
-              <a:t>i</a:t>
-            </a:r>
-            <a:r>
-              <a:rPr lang="en-US" dirty="0" smtClean="0"/>
-              <a:t>nvert the transformation and add to </a:t>
-            </a:r>
-            <a:r>
-              <a:rPr lang="en-US" dirty="0" err="1" smtClean="0"/>
-              <a:t>hashmap</a:t>
-            </a:r>
-            <a:r>
-              <a:rPr lang="en-US" dirty="0" smtClean="0"/>
-              <a:t> for that frame </a:t>
-            </a:r>
-          </a:p>
-          <a:p>
-            <a:pPr marL="457200" indent="-457200">
-              <a:buFont typeface="+mj-lt"/>
-              <a:buAutoNum type="arabicPeriod"/>
-            </a:pPr>
-            <a:endParaRPr lang="en-US" dirty="0" smtClean="0"/>
-          </a:p>
-        </p:txBody>
-      </p:sp>
-      <p:sp>
-        <p:nvSpPr>
-          <p:cNvPr id="4" name="TextBox 3"/>
-          <p:cNvSpPr txBox="1"/>
-          <p:nvPr/>
-        </p:nvSpPr>
-        <p:spPr>
-          <a:xfrm>
-            <a:off x="3657600" y="880533"/>
-            <a:ext cx="184666" cy="369332"/>
-          </a:xfrm>
-          <a:prstGeom prst="rect">
-            <a:avLst/>
-          </a:prstGeom>
-          <a:noFill/>
-        </p:spPr>
-        <p:txBody>
-          <a:bodyPr wrap="none" rtlCol="0">
-            <a:spAutoFit/>
-          </a:bodyPr>
-          <a:lstStyle/>
-          <a:p>
             <a:endParaRPr lang="en-US" dirty="0"/>
           </a:p>
         </p:txBody>
@@ -3733,20 +4618,13 @@
     </p:spTree>
     <p:extLst>
       <p:ext uri="{BB962C8B-B14F-4D97-AF65-F5344CB8AC3E}">
-        <p14:creationId xmlns:p14="http://schemas.microsoft.com/office/powerpoint/2010/main" val="1379762577"/>
+        <p14:creationId xmlns:p14="http://schemas.microsoft.com/office/powerpoint/2010/main" val="1718875644"/>
       </p:ext>
     </p:extLst>
   </p:cSld>
   <p:clrMapOvr>
     <a:masterClrMapping/>
   </p:clrMapOvr>
-  <p:timing>
-    <p:tnLst>
-      <p:par>
-        <p:cTn xmlns:p14="http://schemas.microsoft.com/office/powerpoint/2010/main" id="1" dur="indefinite" restart="never" nodeType="tmRoot"/>
-      </p:par>
-    </p:tnLst>
-  </p:timing>
 </p:sld>
 </file>
 
@@ -3784,7 +4662,7 @@
           <a:p>
             <a:r>
               <a:rPr lang="en-US" dirty="0" smtClean="0"/>
-              <a:t>METHOD 1</a:t>
+              <a:t>METHOD 2 (No Triangulation)</a:t>
             </a:r>
             <a:endParaRPr lang="en-US" dirty="0"/>
           </a:p>
@@ -3805,95 +4683,30 @@
           <a:bodyPr/>
           <a:lstStyle/>
           <a:p>
-            <a:pPr marL="457200" indent="-457200">
-              <a:buFont typeface="+mj-lt"/>
-              <a:buAutoNum type="arabicPeriod" startAt="4"/>
-            </a:pPr>
-            <a:r>
-              <a:rPr lang="en-US" dirty="0" smtClean="0"/>
-              <a:t>For every point in B</a:t>
-            </a:r>
-          </a:p>
-          <a:p>
-            <a:pPr lvl="1"/>
-            <a:r>
-              <a:rPr lang="en-US" dirty="0" smtClean="0"/>
-              <a:t>Find the triangle it is contained in</a:t>
-            </a:r>
-          </a:p>
-          <a:p>
-            <a:pPr lvl="1"/>
-            <a:r>
-              <a:rPr lang="en-US" dirty="0" smtClean="0"/>
-              <a:t>Find the corresponding inverse mapping </a:t>
-            </a:r>
-          </a:p>
-          <a:p>
-            <a:pPr lvl="1"/>
-            <a:r>
-              <a:rPr lang="en-US" dirty="0" smtClean="0"/>
-              <a:t>Apply the inverse warp to get the point in A</a:t>
-            </a:r>
-          </a:p>
-          <a:p>
-            <a:pPr lvl="1"/>
-            <a:r>
-              <a:rPr lang="en-US" dirty="0" smtClean="0"/>
-              <a:t>Use </a:t>
-            </a:r>
-          </a:p>
-          <a:p>
-            <a:pPr lvl="1"/>
-            <a:endParaRPr lang="en-US" dirty="0" smtClean="0"/>
-          </a:p>
-          <a:p>
-            <a:pPr marL="457200" indent="-457200">
-              <a:buFont typeface="+mj-lt"/>
-              <a:buAutoNum type="arabicPeriod" startAt="5"/>
-            </a:pPr>
-            <a:r>
-              <a:rPr lang="en-US" dirty="0" smtClean="0"/>
-              <a:t>Linear interpolation using ‘remap’   (</a:t>
-            </a:r>
-            <a:r>
-              <a:rPr lang="en-US" dirty="0" err="1" smtClean="0"/>
-              <a:t>equaivalent</a:t>
-            </a:r>
-            <a:r>
-              <a:rPr lang="en-US" dirty="0" smtClean="0"/>
-              <a:t> of interp2)</a:t>
-            </a:r>
-          </a:p>
-          <a:p>
-            <a:pPr marL="457200" indent="-457200">
-              <a:buFont typeface="+mj-lt"/>
-              <a:buAutoNum type="arabicPeriod" startAt="5"/>
-            </a:pPr>
-            <a:r>
-              <a:rPr lang="en-US" dirty="0" smtClean="0"/>
-              <a:t>“Cross-dissolve” between A and B </a:t>
-            </a:r>
-          </a:p>
-          <a:p>
-            <a:pPr marL="0" indent="0">
-              <a:buNone/>
-            </a:pPr>
-            <a:endParaRPr lang="en-US" dirty="0" smtClean="0"/>
-          </a:p>
-          <a:p>
-            <a:pPr marL="0" indent="0">
-              <a:buNone/>
-            </a:pPr>
-            <a:endParaRPr lang="en-US" dirty="0"/>
-          </a:p>
-          <a:p>
-            <a:endParaRPr lang="en-US" dirty="0"/>
-          </a:p>
-          <a:p>
-            <a:pPr marL="457200" indent="-457200">
-              <a:buFont typeface="+mj-lt"/>
-              <a:buAutoNum type="arabicPeriod" startAt="5"/>
-            </a:pPr>
+            <a:r>
+              <a:rPr lang="en-US" dirty="0" smtClean="0"/>
+              <a:t>No triangulation</a:t>
+            </a:r>
+          </a:p>
+          <a:p>
+            <a:r>
+              <a:rPr lang="en-US" dirty="0" smtClean="0"/>
+              <a:t>Map every point using dense optical flow field</a:t>
+            </a:r>
+          </a:p>
+          <a:p>
+            <a:r>
+              <a:rPr lang="en-US" dirty="0" smtClean="0"/>
+              <a:t>Interpolation procedure:  same as method1</a:t>
+            </a:r>
+          </a:p>
+          <a:p>
+            <a:r>
+              <a:rPr lang="en-US" dirty="0" smtClean="0"/>
+              <a:t>Remap procedure : same as method 1</a:t>
+            </a:r>
+          </a:p>
+          <a:p>
             <a:endParaRPr lang="en-US" dirty="0"/>
           </a:p>
         </p:txBody>
@@ -3901,7 +4714,657 @@
     </p:spTree>
     <p:extLst>
       <p:ext uri="{BB962C8B-B14F-4D97-AF65-F5344CB8AC3E}">
-        <p14:creationId xmlns:p14="http://schemas.microsoft.com/office/powerpoint/2010/main" val="1718875644"/>
+        <p14:creationId xmlns:p14="http://schemas.microsoft.com/office/powerpoint/2010/main" val="2411495627"/>
+      </p:ext>
+    </p:extLst>
+  </p:cSld>
+  <p:clrMapOvr>
+    <a:masterClrMapping/>
+  </p:clrMapOvr>
+  <p:timing>
+    <p:tnLst>
+      <p:par>
+        <p:cTn xmlns:p14="http://schemas.microsoft.com/office/powerpoint/2010/main" id="1" dur="indefinite" restart="never" nodeType="tmRoot"/>
+      </p:par>
+    </p:tnLst>
+  </p:timing>
+</p:sld>
+</file>
+
+<file path=ppt/slides/slide5.xml><?xml version="1.0" encoding="utf-8"?>
+<p:sld xmlns:a="http://schemas.openxmlformats.org/drawingml/2006/main" xmlns:r="http://schemas.openxmlformats.org/officeDocument/2006/relationships" xmlns:p="http://schemas.openxmlformats.org/presentationml/2006/main">
+  <p:cSld>
+    <p:spTree>
+      <p:nvGrpSpPr>
+        <p:cNvPr id="1" name=""/>
+        <p:cNvGrpSpPr/>
+        <p:nvPr/>
+      </p:nvGrpSpPr>
+      <p:grpSpPr>
+        <a:xfrm>
+          <a:off x="0" y="0"/>
+          <a:ext cx="0" cy="0"/>
+          <a:chOff x="0" y="0"/>
+          <a:chExt cx="0" cy="0"/>
+        </a:xfrm>
+      </p:grpSpPr>
+      <p:sp>
+        <p:nvSpPr>
+          <p:cNvPr id="2" name="Title 1"/>
+          <p:cNvSpPr>
+            <a:spLocks noGrp="1"/>
+          </p:cNvSpPr>
+          <p:nvPr>
+            <p:ph type="title"/>
+          </p:nvPr>
+        </p:nvSpPr>
+        <p:spPr/>
+        <p:txBody>
+          <a:bodyPr/>
+          <a:lstStyle/>
+          <a:p>
+            <a:r>
+              <a:rPr lang="en-US" dirty="0" smtClean="0"/>
+              <a:t>Interpolations</a:t>
+            </a:r>
+            <a:endParaRPr lang="en-US" dirty="0"/>
+          </a:p>
+        </p:txBody>
+      </p:sp>
+      <p:sp>
+        <p:nvSpPr>
+          <p:cNvPr id="3" name="Content Placeholder 2"/>
+          <p:cNvSpPr>
+            <a:spLocks noGrp="1"/>
+          </p:cNvSpPr>
+          <p:nvPr>
+            <p:ph idx="1"/>
+          </p:nvPr>
+        </p:nvSpPr>
+        <p:spPr/>
+        <p:txBody>
+          <a:bodyPr/>
+          <a:lstStyle/>
+          <a:p>
+            <a:r>
+              <a:rPr lang="en-US" dirty="0" smtClean="0"/>
+              <a:t>From </a:t>
+            </a:r>
+            <a:r>
+              <a:rPr lang="en-US" dirty="0" err="1" smtClean="0"/>
+              <a:t>opencv</a:t>
+            </a:r>
+            <a:r>
+              <a:rPr lang="en-US" dirty="0" smtClean="0"/>
+              <a:t> docs:</a:t>
+            </a:r>
+          </a:p>
+          <a:p>
+            <a:r>
+              <a:rPr lang="en-US" dirty="0"/>
+              <a:t>The function finds an optical flow for each </a:t>
+            </a:r>
+            <a:r>
+              <a:rPr lang="en-US" dirty="0" err="1"/>
+              <a:t>prev</a:t>
+            </a:r>
+            <a:r>
+              <a:rPr lang="en-US" dirty="0"/>
+              <a:t> pixel using the </a:t>
+            </a:r>
+            <a:r>
+              <a:rPr lang="en-US" dirty="0">
+                <a:hlinkClick r:id="rId2"/>
+              </a:rPr>
+              <a:t>[Farneback2003]</a:t>
+            </a:r>
+            <a:r>
+              <a:rPr lang="en-US" dirty="0"/>
+              <a:t> algorithm so </a:t>
+            </a:r>
+            <a:r>
+              <a:rPr lang="en-US" dirty="0" smtClean="0"/>
+              <a:t>that</a:t>
+            </a:r>
+          </a:p>
+          <a:p>
+            <a:endParaRPr lang="en-US" dirty="0" smtClean="0"/>
+          </a:p>
+          <a:p>
+            <a:r>
+              <a:rPr lang="en-US" dirty="0"/>
+              <a:t> </a:t>
+            </a:r>
+            <a:r>
+              <a:rPr lang="en-US" dirty="0" smtClean="0"/>
+              <a:t> </a:t>
+            </a:r>
+            <a:r>
+              <a:rPr lang="en-US" dirty="0" err="1" smtClean="0"/>
+              <a:t>prev</a:t>
+            </a:r>
+            <a:r>
+              <a:rPr lang="en-US" dirty="0" smtClean="0"/>
+              <a:t>(</a:t>
+            </a:r>
+            <a:r>
+              <a:rPr lang="en-US" dirty="0" err="1" smtClean="0"/>
+              <a:t>y,x</a:t>
+            </a:r>
+            <a:r>
+              <a:rPr lang="en-US" dirty="0" smtClean="0"/>
+              <a:t>) ~    next(y + flow(</a:t>
+            </a:r>
+            <a:r>
+              <a:rPr lang="en-US" dirty="0" err="1" smtClean="0"/>
+              <a:t>y,x</a:t>
+            </a:r>
+            <a:r>
+              <a:rPr lang="en-US" dirty="0" smtClean="0"/>
+              <a:t>)[1],  x + flow(</a:t>
+            </a:r>
+            <a:r>
+              <a:rPr lang="en-US" dirty="0" err="1" smtClean="0"/>
+              <a:t>y,x</a:t>
+            </a:r>
+            <a:r>
+              <a:rPr lang="en-US" dirty="0" smtClean="0"/>
+              <a:t>)[0])</a:t>
+            </a:r>
+          </a:p>
+          <a:p>
+            <a:endParaRPr lang="en-US" dirty="0" smtClean="0"/>
+          </a:p>
+          <a:p>
+            <a:r>
+              <a:rPr lang="en-US" dirty="0" smtClean="0"/>
+              <a:t>So, for 3 interpolated frames, we have:</a:t>
+            </a:r>
+            <a:endParaRPr lang="en-US" dirty="0"/>
+          </a:p>
+          <a:p>
+            <a:r>
+              <a:rPr lang="en-US" dirty="0" err="1"/>
+              <a:t>p</a:t>
+            </a:r>
+            <a:r>
+              <a:rPr lang="en-US" dirty="0" err="1" smtClean="0"/>
+              <a:t>rev</a:t>
+            </a:r>
+            <a:r>
+              <a:rPr lang="en-US" dirty="0" smtClean="0"/>
+              <a:t>(</a:t>
+            </a:r>
+            <a:r>
+              <a:rPr lang="en-US" dirty="0" err="1" smtClean="0"/>
+              <a:t>y,x</a:t>
+            </a:r>
+            <a:r>
+              <a:rPr lang="en-US" dirty="0" smtClean="0"/>
+              <a:t>) ~ next(y + alpha * flow(</a:t>
+            </a:r>
+            <a:r>
+              <a:rPr lang="en-US" dirty="0" err="1" smtClean="0"/>
+              <a:t>y,x</a:t>
+            </a:r>
+            <a:r>
+              <a:rPr lang="en-US" dirty="0" smtClean="0"/>
+              <a:t>)[1] + alpha * flow(</a:t>
+            </a:r>
+            <a:r>
+              <a:rPr lang="en-US" dirty="0" err="1" smtClean="0"/>
+              <a:t>y,x</a:t>
+            </a:r>
+            <a:r>
+              <a:rPr lang="en-US" dirty="0" smtClean="0"/>
+              <a:t>)[0])</a:t>
+            </a:r>
+          </a:p>
+          <a:p>
+            <a:r>
+              <a:rPr lang="en-US" dirty="0" smtClean="0"/>
+              <a:t>Where alpha = { 0.75, 0.5, 0.25} </a:t>
+            </a:r>
+            <a:endParaRPr lang="en-US" dirty="0"/>
+          </a:p>
+          <a:p>
+            <a:endParaRPr lang="en-US" dirty="0" smtClean="0"/>
+          </a:p>
+          <a:p>
+            <a:pPr marL="0" indent="0">
+              <a:buNone/>
+            </a:pPr>
+            <a:endParaRPr lang="en-US" dirty="0"/>
+          </a:p>
+          <a:p>
+            <a:endParaRPr lang="en-US" dirty="0" smtClean="0"/>
+          </a:p>
+          <a:p>
+            <a:endParaRPr lang="en-US" dirty="0"/>
+          </a:p>
+          <a:p>
+            <a:endParaRPr lang="en-US" dirty="0"/>
+          </a:p>
+          <a:p>
+            <a:endParaRPr lang="en-US" dirty="0"/>
+          </a:p>
+          <a:p>
+            <a:endParaRPr lang="en-US" dirty="0"/>
+          </a:p>
+        </p:txBody>
+      </p:sp>
+    </p:spTree>
+    <p:extLst>
+      <p:ext uri="{BB962C8B-B14F-4D97-AF65-F5344CB8AC3E}">
+        <p14:creationId xmlns:p14="http://schemas.microsoft.com/office/powerpoint/2010/main" val="3657222704"/>
+      </p:ext>
+    </p:extLst>
+  </p:cSld>
+  <p:clrMapOvr>
+    <a:masterClrMapping/>
+  </p:clrMapOvr>
+  <p:timing>
+    <p:tnLst>
+      <p:par>
+        <p:cTn xmlns:p14="http://schemas.microsoft.com/office/powerpoint/2010/main" id="1" dur="indefinite" restart="never" nodeType="tmRoot"/>
+      </p:par>
+    </p:tnLst>
+  </p:timing>
+</p:sld>
+</file>
+
+<file path=ppt/slides/slide6.xml><?xml version="1.0" encoding="utf-8"?>
+<p:sld xmlns:a="http://schemas.openxmlformats.org/drawingml/2006/main" xmlns:r="http://schemas.openxmlformats.org/officeDocument/2006/relationships" xmlns:p="http://schemas.openxmlformats.org/presentationml/2006/main">
+  <p:cSld>
+    <p:spTree>
+      <p:nvGrpSpPr>
+        <p:cNvPr id="1" name=""/>
+        <p:cNvGrpSpPr/>
+        <p:nvPr/>
+      </p:nvGrpSpPr>
+      <p:grpSpPr>
+        <a:xfrm>
+          <a:off x="0" y="0"/>
+          <a:ext cx="0" cy="0"/>
+          <a:chOff x="0" y="0"/>
+          <a:chExt cx="0" cy="0"/>
+        </a:xfrm>
+      </p:grpSpPr>
+      <p:sp>
+        <p:nvSpPr>
+          <p:cNvPr id="2" name="Title 1"/>
+          <p:cNvSpPr>
+            <a:spLocks noGrp="1"/>
+          </p:cNvSpPr>
+          <p:nvPr>
+            <p:ph type="title"/>
+          </p:nvPr>
+        </p:nvSpPr>
+        <p:spPr/>
+        <p:txBody>
+          <a:bodyPr/>
+          <a:lstStyle/>
+          <a:p>
+            <a:r>
+              <a:rPr lang="en-US" dirty="0" smtClean="0"/>
+              <a:t>NOT ALL FLOWS ARE EQUAL !</a:t>
+            </a:r>
+            <a:endParaRPr lang="en-US" dirty="0"/>
+          </a:p>
+        </p:txBody>
+      </p:sp>
+      <p:sp>
+        <p:nvSpPr>
+          <p:cNvPr id="3" name="Content Placeholder 2"/>
+          <p:cNvSpPr>
+            <a:spLocks noGrp="1"/>
+          </p:cNvSpPr>
+          <p:nvPr>
+            <p:ph idx="1"/>
+          </p:nvPr>
+        </p:nvSpPr>
+        <p:spPr/>
+        <p:txBody>
+          <a:bodyPr/>
+          <a:lstStyle/>
+          <a:p>
+            <a:r>
+              <a:rPr lang="en-US" dirty="0" err="1" smtClean="0"/>
+              <a:t>OpenCV</a:t>
+            </a:r>
+            <a:r>
+              <a:rPr lang="en-US" dirty="0" smtClean="0"/>
+              <a:t> default dense flow : </a:t>
+            </a:r>
+            <a:r>
+              <a:rPr lang="en-US" dirty="0" err="1" smtClean="0"/>
+              <a:t>Farneback</a:t>
+            </a:r>
+            <a:r>
+              <a:rPr lang="en-US" dirty="0" smtClean="0"/>
+              <a:t>  (2003)</a:t>
+            </a:r>
+          </a:p>
+          <a:p>
+            <a:r>
+              <a:rPr lang="en-US" dirty="0" err="1" smtClean="0"/>
+              <a:t>DeepFlow</a:t>
+            </a:r>
+            <a:r>
+              <a:rPr lang="en-US" dirty="0" smtClean="0"/>
+              <a:t> : algorithm from INRIA LEAR (2012)</a:t>
+            </a:r>
+          </a:p>
+          <a:p>
+            <a:r>
+              <a:rPr lang="en-US" dirty="0" smtClean="0"/>
+              <a:t>EPIC Flow : Edge preserving interpolation of correspondences </a:t>
+            </a:r>
+          </a:p>
+          <a:p>
+            <a:r>
+              <a:rPr lang="en-US" dirty="0" smtClean="0"/>
+              <a:t> best according to evaluation by MPI SINTEL (</a:t>
+            </a:r>
+            <a:r>
+              <a:rPr lang="en-US" dirty="0" err="1" smtClean="0"/>
+              <a:t>relaistic</a:t>
+            </a:r>
+            <a:r>
+              <a:rPr lang="en-US" dirty="0" smtClean="0"/>
+              <a:t> videos generated by  graphics + vision and hence has ground truth to quantitatively evaluate flow algorithms)</a:t>
+            </a:r>
+            <a:endParaRPr lang="en-US" dirty="0"/>
+          </a:p>
+        </p:txBody>
+      </p:sp>
+    </p:spTree>
+    <p:extLst>
+      <p:ext uri="{BB962C8B-B14F-4D97-AF65-F5344CB8AC3E}">
+        <p14:creationId xmlns:p14="http://schemas.microsoft.com/office/powerpoint/2010/main" val="2169019135"/>
+      </p:ext>
+    </p:extLst>
+  </p:cSld>
+  <p:clrMapOvr>
+    <a:masterClrMapping/>
+  </p:clrMapOvr>
+  <p:timing>
+    <p:tnLst>
+      <p:par>
+        <p:cTn xmlns:p14="http://schemas.microsoft.com/office/powerpoint/2010/main" id="1" dur="indefinite" restart="never" nodeType="tmRoot"/>
+      </p:par>
+    </p:tnLst>
+  </p:timing>
+</p:sld>
+</file>
+
+<file path=ppt/slides/slide7.xml><?xml version="1.0" encoding="utf-8"?>
+<p:sld xmlns:a="http://schemas.openxmlformats.org/drawingml/2006/main" xmlns:r="http://schemas.openxmlformats.org/officeDocument/2006/relationships" xmlns:p="http://schemas.openxmlformats.org/presentationml/2006/main">
+  <p:cSld>
+    <p:spTree>
+      <p:nvGrpSpPr>
+        <p:cNvPr id="1" name=""/>
+        <p:cNvGrpSpPr/>
+        <p:nvPr/>
+      </p:nvGrpSpPr>
+      <p:grpSpPr>
+        <a:xfrm>
+          <a:off x="0" y="0"/>
+          <a:ext cx="0" cy="0"/>
+          <a:chOff x="0" y="0"/>
+          <a:chExt cx="0" cy="0"/>
+        </a:xfrm>
+      </p:grpSpPr>
+      <p:sp>
+        <p:nvSpPr>
+          <p:cNvPr id="2" name="Title 1"/>
+          <p:cNvSpPr>
+            <a:spLocks noGrp="1"/>
+          </p:cNvSpPr>
+          <p:nvPr>
+            <p:ph type="title"/>
+          </p:nvPr>
+        </p:nvSpPr>
+        <p:spPr/>
+        <p:txBody>
+          <a:bodyPr/>
+          <a:lstStyle/>
+          <a:p>
+            <a:r>
+              <a:rPr lang="en-US" dirty="0" smtClean="0"/>
+              <a:t>FARENBACK FLOW</a:t>
+            </a:r>
+            <a:endParaRPr lang="en-US" dirty="0"/>
+          </a:p>
+        </p:txBody>
+      </p:sp>
+      <p:pic>
+        <p:nvPicPr>
+          <p:cNvPr id="4" name="Content Placeholder 3" descr="flow_0020.png"/>
+          <p:cNvPicPr>
+            <a:picLocks noGrp="1" noChangeAspect="1"/>
+          </p:cNvPicPr>
+          <p:nvPr>
+            <p:ph idx="1"/>
+          </p:nvPr>
+        </p:nvPicPr>
+        <p:blipFill>
+          <a:blip r:embed="rId2">
+            <a:extLst>
+              <a:ext uri="{28A0092B-C50C-407E-A947-70E740481C1C}">
+                <a14:useLocalDpi xmlns:a14="http://schemas.microsoft.com/office/drawing/2010/main" val="0"/>
+              </a:ext>
+            </a:extLst>
+          </a:blip>
+          <a:srcRect l="-34375" r="-34375"/>
+          <a:stretch>
+            <a:fillRect/>
+          </a:stretch>
+        </p:blipFill>
+        <p:spPr/>
+      </p:pic>
+    </p:spTree>
+    <p:extLst>
+      <p:ext uri="{BB962C8B-B14F-4D97-AF65-F5344CB8AC3E}">
+        <p14:creationId xmlns:p14="http://schemas.microsoft.com/office/powerpoint/2010/main" val="994551445"/>
+      </p:ext>
+    </p:extLst>
+  </p:cSld>
+  <p:clrMapOvr>
+    <a:masterClrMapping/>
+  </p:clrMapOvr>
+  <p:timing>
+    <p:tnLst>
+      <p:par>
+        <p:cTn xmlns:p14="http://schemas.microsoft.com/office/powerpoint/2010/main" id="1" dur="indefinite" restart="never" nodeType="tmRoot"/>
+      </p:par>
+    </p:tnLst>
+  </p:timing>
+</p:sld>
+</file>
+
+<file path=ppt/slides/slide8.xml><?xml version="1.0" encoding="utf-8"?>
+<p:sld xmlns:a="http://schemas.openxmlformats.org/drawingml/2006/main" xmlns:r="http://schemas.openxmlformats.org/officeDocument/2006/relationships" xmlns:p="http://schemas.openxmlformats.org/presentationml/2006/main">
+  <p:cSld>
+    <p:spTree>
+      <p:nvGrpSpPr>
+        <p:cNvPr id="1" name=""/>
+        <p:cNvGrpSpPr/>
+        <p:nvPr/>
+      </p:nvGrpSpPr>
+      <p:grpSpPr>
+        <a:xfrm>
+          <a:off x="0" y="0"/>
+          <a:ext cx="0" cy="0"/>
+          <a:chOff x="0" y="0"/>
+          <a:chExt cx="0" cy="0"/>
+        </a:xfrm>
+      </p:grpSpPr>
+      <p:sp>
+        <p:nvSpPr>
+          <p:cNvPr id="2" name="Title 1"/>
+          <p:cNvSpPr>
+            <a:spLocks noGrp="1"/>
+          </p:cNvSpPr>
+          <p:nvPr>
+            <p:ph type="title"/>
+          </p:nvPr>
+        </p:nvSpPr>
+        <p:spPr/>
+        <p:txBody>
+          <a:bodyPr/>
+          <a:lstStyle/>
+          <a:p>
+            <a:r>
+              <a:rPr lang="en-US" dirty="0" smtClean="0"/>
+              <a:t>DEEP FLOW</a:t>
+            </a:r>
+            <a:endParaRPr lang="en-US" dirty="0"/>
+          </a:p>
+        </p:txBody>
+      </p:sp>
+      <p:pic>
+        <p:nvPicPr>
+          <p:cNvPr id="4" name="Content Placeholder 3" descr="flow_0020.png"/>
+          <p:cNvPicPr>
+            <a:picLocks noGrp="1" noChangeAspect="1"/>
+          </p:cNvPicPr>
+          <p:nvPr>
+            <p:ph idx="1"/>
+          </p:nvPr>
+        </p:nvPicPr>
+        <p:blipFill>
+          <a:blip r:embed="rId2">
+            <a:extLst>
+              <a:ext uri="{28A0092B-C50C-407E-A947-70E740481C1C}">
+                <a14:useLocalDpi xmlns:a14="http://schemas.microsoft.com/office/drawing/2010/main" val="0"/>
+              </a:ext>
+            </a:extLst>
+          </a:blip>
+          <a:srcRect l="-34375" r="-34375"/>
+          <a:stretch>
+            <a:fillRect/>
+          </a:stretch>
+        </p:blipFill>
+        <p:spPr/>
+      </p:pic>
+    </p:spTree>
+    <p:extLst>
+      <p:ext uri="{BB962C8B-B14F-4D97-AF65-F5344CB8AC3E}">
+        <p14:creationId xmlns:p14="http://schemas.microsoft.com/office/powerpoint/2010/main" val="2032815769"/>
+      </p:ext>
+    </p:extLst>
+  </p:cSld>
+  <p:clrMapOvr>
+    <a:masterClrMapping/>
+  </p:clrMapOvr>
+  <p:timing>
+    <p:tnLst>
+      <p:par>
+        <p:cTn xmlns:p14="http://schemas.microsoft.com/office/powerpoint/2010/main" id="1" dur="indefinite" restart="never" nodeType="tmRoot"/>
+      </p:par>
+    </p:tnLst>
+  </p:timing>
+</p:sld>
+</file>
+
+<file path=ppt/slides/slide9.xml><?xml version="1.0" encoding="utf-8"?>
+<p:sld xmlns:a="http://schemas.openxmlformats.org/drawingml/2006/main" xmlns:r="http://schemas.openxmlformats.org/officeDocument/2006/relationships" xmlns:p="http://schemas.openxmlformats.org/presentationml/2006/main">
+  <p:cSld>
+    <p:spTree>
+      <p:nvGrpSpPr>
+        <p:cNvPr id="1" name=""/>
+        <p:cNvGrpSpPr/>
+        <p:nvPr/>
+      </p:nvGrpSpPr>
+      <p:grpSpPr>
+        <a:xfrm>
+          <a:off x="0" y="0"/>
+          <a:ext cx="0" cy="0"/>
+          <a:chOff x="0" y="0"/>
+          <a:chExt cx="0" cy="0"/>
+        </a:xfrm>
+      </p:grpSpPr>
+      <p:sp>
+        <p:nvSpPr>
+          <p:cNvPr id="2" name="Title 1"/>
+          <p:cNvSpPr>
+            <a:spLocks noGrp="1"/>
+          </p:cNvSpPr>
+          <p:nvPr>
+            <p:ph type="title"/>
+          </p:nvPr>
+        </p:nvSpPr>
+        <p:spPr/>
+        <p:txBody>
+          <a:bodyPr/>
+          <a:lstStyle/>
+          <a:p>
+            <a:r>
+              <a:rPr lang="en-US" dirty="0" smtClean="0"/>
+              <a:t>  Demo videos</a:t>
+            </a:r>
+            <a:endParaRPr lang="en-US" dirty="0"/>
+          </a:p>
+        </p:txBody>
+      </p:sp>
+      <p:sp>
+        <p:nvSpPr>
+          <p:cNvPr id="3" name="Content Placeholder 2"/>
+          <p:cNvSpPr>
+            <a:spLocks noGrp="1"/>
+          </p:cNvSpPr>
+          <p:nvPr>
+            <p:ph idx="1"/>
+          </p:nvPr>
+        </p:nvSpPr>
+        <p:spPr/>
+        <p:txBody>
+          <a:bodyPr/>
+          <a:lstStyle/>
+          <a:p>
+            <a:r>
+              <a:rPr lang="en-US" dirty="0" err="1" smtClean="0"/>
+              <a:t>Farenback</a:t>
+            </a:r>
+            <a:r>
+              <a:rPr lang="en-US" dirty="0" smtClean="0"/>
+              <a:t> : test video</a:t>
+            </a:r>
+          </a:p>
+          <a:p>
+            <a:r>
+              <a:rPr lang="en-US" dirty="0" err="1" smtClean="0"/>
+              <a:t>DeepFlow</a:t>
+            </a:r>
+            <a:r>
+              <a:rPr lang="en-US" dirty="0" smtClean="0"/>
+              <a:t>  : test video</a:t>
+            </a:r>
+          </a:p>
+          <a:p>
+            <a:r>
+              <a:rPr lang="en-US" dirty="0" err="1" smtClean="0"/>
+              <a:t>Farenback</a:t>
+            </a:r>
+            <a:r>
+              <a:rPr lang="en-US" dirty="0" smtClean="0"/>
+              <a:t> : jump video</a:t>
+            </a:r>
+          </a:p>
+          <a:p>
+            <a:r>
+              <a:rPr lang="en-US" dirty="0" smtClean="0"/>
+              <a:t>Deep Flow : jump video</a:t>
+            </a:r>
+            <a:endParaRPr lang="en-US" dirty="0"/>
+          </a:p>
+        </p:txBody>
+      </p:sp>
+    </p:spTree>
+    <p:extLst>
+      <p:ext uri="{BB962C8B-B14F-4D97-AF65-F5344CB8AC3E}">
+        <p14:creationId xmlns:p14="http://schemas.microsoft.com/office/powerpoint/2010/main" val="437721968"/>
       </p:ext>
     </p:extLst>
   </p:cSld>
@@ -3909,6 +5372,13 @@
     <a:masterClrMapping/>
   </p:clrMapOvr>
 </p:sld>
+</file>
+
+<file path=ppt/tags/tag1.xml><?xml version="1.0" encoding="utf-8"?>
+<p:tagLst xmlns:a="http://schemas.openxmlformats.org/drawingml/2006/main" xmlns:r="http://schemas.openxmlformats.org/officeDocument/2006/relationships" xmlns:p="http://schemas.openxmlformats.org/presentationml/2006/main">
+  <p:tag name="LATEXADDIN" val="\documentclass{article}\pagestyle{empty}&#10;\usepackage{amsmath}&#10;\usepackage{amssymb}&#10;\usepackage{mathpazo}&#10;\usepackage{xcolor}&#10;\begin{document}&#10;&#10;$$&#10;E(\mathbf{w}) = \iint E_{data} + \alpha E_{smooth} \textcolor{red}{+\beta E_{match}} \mathbf{dx}&#10;$$&#10;\end{document}"/>
+  <p:tag name="IGUANATEXSIZE" val="18"/>
+</p:tagLst>
 </file>
 
 <file path=ppt/theme/theme1.xml><?xml version="1.0" encoding="utf-8"?>

</xml_diff>